<commit_message>
Last staging of latex :D
</commit_message>
<xml_diff>
--- a/Diagrams/Presentation1.pptx
+++ b/Diagrams/Presentation1.pptx
@@ -263,7 +263,7 @@
           <a:p>
             <a:fld id="{A505DE10-70D8-44E0-8326-4A949382AB4B}" type="datetimeFigureOut">
               <a:rPr lang="en-US" smtClean="0"/>
-              <a:t>1/5/2018</a:t>
+              <a:t>1/9/2018</a:t>
             </a:fld>
             <a:endParaRPr lang="en-US"/>
           </a:p>
@@ -461,7 +461,7 @@
           <a:p>
             <a:fld id="{A505DE10-70D8-44E0-8326-4A949382AB4B}" type="datetimeFigureOut">
               <a:rPr lang="en-US" smtClean="0"/>
-              <a:t>1/5/2018</a:t>
+              <a:t>1/9/2018</a:t>
             </a:fld>
             <a:endParaRPr lang="en-US"/>
           </a:p>
@@ -669,7 +669,7 @@
           <a:p>
             <a:fld id="{A505DE10-70D8-44E0-8326-4A949382AB4B}" type="datetimeFigureOut">
               <a:rPr lang="en-US" smtClean="0"/>
-              <a:t>1/5/2018</a:t>
+              <a:t>1/9/2018</a:t>
             </a:fld>
             <a:endParaRPr lang="en-US"/>
           </a:p>
@@ -867,7 +867,7 @@
           <a:p>
             <a:fld id="{A505DE10-70D8-44E0-8326-4A949382AB4B}" type="datetimeFigureOut">
               <a:rPr lang="en-US" smtClean="0"/>
-              <a:t>1/5/2018</a:t>
+              <a:t>1/9/2018</a:t>
             </a:fld>
             <a:endParaRPr lang="en-US"/>
           </a:p>
@@ -1142,7 +1142,7 @@
           <a:p>
             <a:fld id="{A505DE10-70D8-44E0-8326-4A949382AB4B}" type="datetimeFigureOut">
               <a:rPr lang="en-US" smtClean="0"/>
-              <a:t>1/5/2018</a:t>
+              <a:t>1/9/2018</a:t>
             </a:fld>
             <a:endParaRPr lang="en-US"/>
           </a:p>
@@ -1407,7 +1407,7 @@
           <a:p>
             <a:fld id="{A505DE10-70D8-44E0-8326-4A949382AB4B}" type="datetimeFigureOut">
               <a:rPr lang="en-US" smtClean="0"/>
-              <a:t>1/5/2018</a:t>
+              <a:t>1/9/2018</a:t>
             </a:fld>
             <a:endParaRPr lang="en-US"/>
           </a:p>
@@ -1819,7 +1819,7 @@
           <a:p>
             <a:fld id="{A505DE10-70D8-44E0-8326-4A949382AB4B}" type="datetimeFigureOut">
               <a:rPr lang="en-US" smtClean="0"/>
-              <a:t>1/5/2018</a:t>
+              <a:t>1/9/2018</a:t>
             </a:fld>
             <a:endParaRPr lang="en-US"/>
           </a:p>
@@ -1960,7 +1960,7 @@
           <a:p>
             <a:fld id="{A505DE10-70D8-44E0-8326-4A949382AB4B}" type="datetimeFigureOut">
               <a:rPr lang="en-US" smtClean="0"/>
-              <a:t>1/5/2018</a:t>
+              <a:t>1/9/2018</a:t>
             </a:fld>
             <a:endParaRPr lang="en-US"/>
           </a:p>
@@ -2073,7 +2073,7 @@
           <a:p>
             <a:fld id="{A505DE10-70D8-44E0-8326-4A949382AB4B}" type="datetimeFigureOut">
               <a:rPr lang="en-US" smtClean="0"/>
-              <a:t>1/5/2018</a:t>
+              <a:t>1/9/2018</a:t>
             </a:fld>
             <a:endParaRPr lang="en-US"/>
           </a:p>
@@ -2384,7 +2384,7 @@
           <a:p>
             <a:fld id="{A505DE10-70D8-44E0-8326-4A949382AB4B}" type="datetimeFigureOut">
               <a:rPr lang="en-US" smtClean="0"/>
-              <a:t>1/5/2018</a:t>
+              <a:t>1/9/2018</a:t>
             </a:fld>
             <a:endParaRPr lang="en-US"/>
           </a:p>
@@ -2672,7 +2672,7 @@
           <a:p>
             <a:fld id="{A505DE10-70D8-44E0-8326-4A949382AB4B}" type="datetimeFigureOut">
               <a:rPr lang="en-US" smtClean="0"/>
-              <a:t>1/5/2018</a:t>
+              <a:t>1/9/2018</a:t>
             </a:fld>
             <a:endParaRPr lang="en-US"/>
           </a:p>
@@ -2913,7 +2913,7 @@
           <a:p>
             <a:fld id="{A505DE10-70D8-44E0-8326-4A949382AB4B}" type="datetimeFigureOut">
               <a:rPr lang="en-US" smtClean="0"/>
-              <a:t>1/5/2018</a:t>
+              <a:t>1/9/2018</a:t>
             </a:fld>
             <a:endParaRPr lang="en-US"/>
           </a:p>
@@ -3332,6 +3332,156 @@
       </p:grpSpPr>
       <p:sp>
         <p:nvSpPr>
+          <p:cNvPr id="15" name="Rectangle 14">
+            <a:extLst>
+              <a:ext uri="{FF2B5EF4-FFF2-40B4-BE49-F238E27FC236}">
+                <a16:creationId xmlns:a16="http://schemas.microsoft.com/office/drawing/2014/main" id="{3EFECFA7-7765-40CF-9F58-2F64A79E6DF0}"/>
+              </a:ext>
+            </a:extLst>
+          </p:cNvPr>
+          <p:cNvSpPr/>
+          <p:nvPr/>
+        </p:nvSpPr>
+        <p:spPr>
+          <a:xfrm>
+            <a:off x="4642657" y="5228694"/>
+            <a:ext cx="2938547" cy="1197033"/>
+          </a:xfrm>
+          <a:prstGeom prst="rect">
+            <a:avLst/>
+          </a:prstGeom>
+        </p:spPr>
+        <p:style>
+          <a:lnRef idx="2">
+            <a:schemeClr val="accent1">
+              <a:shade val="50000"/>
+            </a:schemeClr>
+          </a:lnRef>
+          <a:fillRef idx="1">
+            <a:schemeClr val="accent1"/>
+          </a:fillRef>
+          <a:effectRef idx="0">
+            <a:schemeClr val="accent1"/>
+          </a:effectRef>
+          <a:fontRef idx="minor">
+            <a:schemeClr val="lt1"/>
+          </a:fontRef>
+        </p:style>
+        <p:txBody>
+          <a:bodyPr rtlCol="0" anchor="ctr"/>
+          <a:lstStyle/>
+          <a:p>
+            <a:pPr algn="ctr"/>
+            <a:r>
+              <a:rPr lang="pl-PL" sz="2800" dirty="0"/>
+              <a:t>Widoki</a:t>
+            </a:r>
+            <a:endParaRPr lang="en-US" sz="2800" dirty="0"/>
+          </a:p>
+        </p:txBody>
+      </p:sp>
+      <p:sp>
+        <p:nvSpPr>
+          <p:cNvPr id="14" name="Rectangle 13">
+            <a:extLst>
+              <a:ext uri="{FF2B5EF4-FFF2-40B4-BE49-F238E27FC236}">
+                <a16:creationId xmlns:a16="http://schemas.microsoft.com/office/drawing/2014/main" id="{073AB822-C49A-4B1A-B483-B557B1E555C7}"/>
+              </a:ext>
+            </a:extLst>
+          </p:cNvPr>
+          <p:cNvSpPr/>
+          <p:nvPr/>
+        </p:nvSpPr>
+        <p:spPr>
+          <a:xfrm>
+            <a:off x="4642657" y="3812764"/>
+            <a:ext cx="2938547" cy="1197033"/>
+          </a:xfrm>
+          <a:prstGeom prst="rect">
+            <a:avLst/>
+          </a:prstGeom>
+        </p:spPr>
+        <p:style>
+          <a:lnRef idx="2">
+            <a:schemeClr val="accent1">
+              <a:shade val="50000"/>
+            </a:schemeClr>
+          </a:lnRef>
+          <a:fillRef idx="1">
+            <a:schemeClr val="accent1"/>
+          </a:fillRef>
+          <a:effectRef idx="0">
+            <a:schemeClr val="accent1"/>
+          </a:effectRef>
+          <a:fontRef idx="minor">
+            <a:schemeClr val="lt1"/>
+          </a:fontRef>
+        </p:style>
+        <p:txBody>
+          <a:bodyPr rtlCol="0" anchor="ctr"/>
+          <a:lstStyle/>
+          <a:p>
+            <a:pPr algn="ctr"/>
+            <a:r>
+              <a:rPr lang="pl-PL" sz="2800" dirty="0"/>
+              <a:t>Kontrolery</a:t>
+            </a:r>
+            <a:endParaRPr lang="en-US" sz="2800" dirty="0"/>
+          </a:p>
+        </p:txBody>
+      </p:sp>
+      <p:sp>
+        <p:nvSpPr>
+          <p:cNvPr id="13" name="Rectangle 12">
+            <a:extLst>
+              <a:ext uri="{FF2B5EF4-FFF2-40B4-BE49-F238E27FC236}">
+                <a16:creationId xmlns:a16="http://schemas.microsoft.com/office/drawing/2014/main" id="{96AEF3B1-13EE-4ECA-B801-AD73708AE1CD}"/>
+              </a:ext>
+            </a:extLst>
+          </p:cNvPr>
+          <p:cNvSpPr/>
+          <p:nvPr/>
+        </p:nvSpPr>
+        <p:spPr>
+          <a:xfrm>
+            <a:off x="1704111" y="3812764"/>
+            <a:ext cx="2834639" cy="1197033"/>
+          </a:xfrm>
+          <a:prstGeom prst="rect">
+            <a:avLst/>
+          </a:prstGeom>
+        </p:spPr>
+        <p:style>
+          <a:lnRef idx="2">
+            <a:schemeClr val="accent1">
+              <a:shade val="50000"/>
+            </a:schemeClr>
+          </a:lnRef>
+          <a:fillRef idx="1">
+            <a:schemeClr val="accent1"/>
+          </a:fillRef>
+          <a:effectRef idx="0">
+            <a:schemeClr val="accent1"/>
+          </a:effectRef>
+          <a:fontRef idx="minor">
+            <a:schemeClr val="lt1"/>
+          </a:fontRef>
+        </p:style>
+        <p:txBody>
+          <a:bodyPr rtlCol="0" anchor="ctr"/>
+          <a:lstStyle/>
+          <a:p>
+            <a:pPr algn="ctr"/>
+            <a:r>
+              <a:rPr lang="pl-PL" sz="2800" dirty="0"/>
+              <a:t>Serwisy</a:t>
+            </a:r>
+            <a:endParaRPr lang="en-US" sz="2800" dirty="0"/>
+          </a:p>
+        </p:txBody>
+      </p:sp>
+      <p:sp>
+        <p:nvSpPr>
           <p:cNvPr id="4" name="Rectangle 3">
             <a:extLst>
               <a:ext uri="{FF2B5EF4-FFF2-40B4-BE49-F238E27FC236}">
@@ -3373,10 +3523,10 @@
           <a:p>
             <a:pPr algn="ctr"/>
             <a:r>
-              <a:rPr lang="pl-PL" dirty="0"/>
+              <a:rPr lang="pl-PL" sz="2800" dirty="0"/>
               <a:t>Serwer</a:t>
             </a:r>
-            <a:endParaRPr lang="en-US" dirty="0"/>
+            <a:endParaRPr lang="en-US" sz="2800" dirty="0"/>
           </a:p>
         </p:txBody>
       </p:sp>
@@ -3395,7 +3545,7 @@
         <p:spPr>
           <a:xfrm>
             <a:off x="7880464" y="2396836"/>
-            <a:ext cx="1313411" cy="1197033"/>
+            <a:ext cx="2676698" cy="1197033"/>
           </a:xfrm>
           <a:prstGeom prst="rect">
             <a:avLst/>
@@ -3423,10 +3573,10 @@
           <a:p>
             <a:pPr algn="ctr"/>
             <a:r>
-              <a:rPr lang="pl-PL" dirty="0"/>
+              <a:rPr lang="pl-PL" sz="2800" dirty="0"/>
               <a:t>Strona WWW</a:t>
             </a:r>
-            <a:endParaRPr lang="en-US" dirty="0"/>
+            <a:endParaRPr lang="en-US" sz="2800" dirty="0"/>
           </a:p>
         </p:txBody>
       </p:sp>
@@ -3444,8 +3594,8 @@
         </p:nvSpPr>
         <p:spPr>
           <a:xfrm>
-            <a:off x="9393381" y="2396836"/>
-            <a:ext cx="1213658" cy="1197033"/>
+            <a:off x="7880461" y="5228694"/>
+            <a:ext cx="2676699" cy="1197033"/>
           </a:xfrm>
           <a:prstGeom prst="rect">
             <a:avLst/>
@@ -3473,10 +3623,10 @@
           <a:p>
             <a:pPr algn="ctr"/>
             <a:r>
-              <a:rPr lang="pl-PL" dirty="0"/>
-              <a:t>Skrypt JavaScript</a:t>
-            </a:r>
-            <a:endParaRPr lang="en-US" dirty="0"/>
+              <a:rPr lang="pl-PL" sz="2800" dirty="0"/>
+              <a:t>Skrypty JavaScript</a:t>
+            </a:r>
+            <a:endParaRPr lang="en-US" sz="2800" dirty="0"/>
           </a:p>
         </p:txBody>
       </p:sp>
@@ -3495,7 +3645,7 @@
         <p:spPr>
           <a:xfrm>
             <a:off x="7880463" y="980901"/>
-            <a:ext cx="4139740" cy="1197033"/>
+            <a:ext cx="2676697" cy="1197033"/>
           </a:xfrm>
           <a:prstGeom prst="rect">
             <a:avLst/>
@@ -3523,7 +3673,7 @@
           <a:p>
             <a:pPr algn="ctr"/>
             <a:r>
-              <a:rPr lang="pl-PL" dirty="0"/>
+              <a:rPr lang="pl-PL" sz="2800" dirty="0"/>
               <a:t>Aplikacja kliencka</a:t>
             </a:r>
           </a:p>
@@ -3543,8 +3693,8 @@
         </p:nvSpPr>
         <p:spPr>
           <a:xfrm>
-            <a:off x="10806545" y="2396835"/>
-            <a:ext cx="1213658" cy="1197033"/>
+            <a:off x="7880462" y="3812764"/>
+            <a:ext cx="2676699" cy="1197033"/>
           </a:xfrm>
           <a:prstGeom prst="rect">
             <a:avLst/>
@@ -3572,10 +3722,10 @@
           <a:p>
             <a:pPr algn="ctr"/>
             <a:r>
-              <a:rPr lang="pl-PL" dirty="0"/>
+              <a:rPr lang="pl-PL" sz="2800" dirty="0"/>
               <a:t>Style CSS</a:t>
             </a:r>
-            <a:endParaRPr lang="en-US" dirty="0"/>
+            <a:endParaRPr lang="en-US" sz="2800" dirty="0"/>
           </a:p>
         </p:txBody>
       </p:sp>
@@ -3622,10 +3772,10 @@
           <a:p>
             <a:pPr algn="ctr"/>
             <a:r>
-              <a:rPr lang="pl-PL" dirty="0"/>
+              <a:rPr lang="pl-PL" sz="2800" dirty="0"/>
               <a:t>Serwer SQL</a:t>
             </a:r>
-            <a:endParaRPr lang="en-US" dirty="0"/>
+            <a:endParaRPr lang="en-US" sz="2800" dirty="0"/>
           </a:p>
         </p:txBody>
       </p:sp>
@@ -3672,19 +3822,19 @@
           <a:p>
             <a:pPr algn="ctr"/>
             <a:r>
-              <a:rPr lang="pl-PL" dirty="0"/>
+              <a:rPr lang="pl-PL" sz="2800" dirty="0"/>
               <a:t>Aplikacja ASP.NET MVC</a:t>
             </a:r>
-            <a:endParaRPr lang="en-US" dirty="0"/>
-          </a:p>
-        </p:txBody>
-      </p:sp>
-      <p:sp>
-        <p:nvSpPr>
-          <p:cNvPr id="11" name="Rectangle 10">
-            <a:extLst>
-              <a:ext uri="{FF2B5EF4-FFF2-40B4-BE49-F238E27FC236}">
-                <a16:creationId xmlns:a16="http://schemas.microsoft.com/office/drawing/2014/main" id="{6DD921D8-4F49-4B20-8FE2-651E5F13360A}"/>
+            <a:endParaRPr lang="en-US" sz="2800" dirty="0"/>
+          </a:p>
+        </p:txBody>
+      </p:sp>
+      <p:sp>
+        <p:nvSpPr>
+          <p:cNvPr id="12" name="Rectangle 11">
+            <a:extLst>
+              <a:ext uri="{FF2B5EF4-FFF2-40B4-BE49-F238E27FC236}">
+                <a16:creationId xmlns:a16="http://schemas.microsoft.com/office/drawing/2014/main" id="{874AFB3E-9040-4996-A5CB-939A4AD2ED1C}"/>
               </a:ext>
             </a:extLst>
           </p:cNvPr>
@@ -3693,8 +3843,8 @@
         </p:nvSpPr>
         <p:spPr>
           <a:xfrm>
-            <a:off x="4746566" y="3812765"/>
-            <a:ext cx="1313411" cy="1197033"/>
+            <a:off x="1704111" y="5228694"/>
+            <a:ext cx="2834639" cy="1197033"/>
           </a:xfrm>
           <a:prstGeom prst="rect">
             <a:avLst/>
@@ -3722,160 +3872,10 @@
           <a:p>
             <a:pPr algn="ctr"/>
             <a:r>
-              <a:rPr lang="pl-PL" dirty="0"/>
-              <a:t>Kontrolery</a:t>
-            </a:r>
-            <a:endParaRPr lang="en-US" dirty="0"/>
-          </a:p>
-        </p:txBody>
-      </p:sp>
-      <p:sp>
-        <p:nvSpPr>
-          <p:cNvPr id="12" name="Rectangle 11">
-            <a:extLst>
-              <a:ext uri="{FF2B5EF4-FFF2-40B4-BE49-F238E27FC236}">
-                <a16:creationId xmlns:a16="http://schemas.microsoft.com/office/drawing/2014/main" id="{874AFB3E-9040-4996-A5CB-939A4AD2ED1C}"/>
-              </a:ext>
-            </a:extLst>
-          </p:cNvPr>
-          <p:cNvSpPr/>
-          <p:nvPr/>
-        </p:nvSpPr>
-        <p:spPr>
-          <a:xfrm>
-            <a:off x="1704112" y="3812767"/>
-            <a:ext cx="1313411" cy="1197033"/>
-          </a:xfrm>
-          <a:prstGeom prst="rect">
-            <a:avLst/>
-          </a:prstGeom>
-        </p:spPr>
-        <p:style>
-          <a:lnRef idx="2">
-            <a:schemeClr val="accent1">
-              <a:shade val="50000"/>
-            </a:schemeClr>
-          </a:lnRef>
-          <a:fillRef idx="1">
-            <a:schemeClr val="accent1"/>
-          </a:fillRef>
-          <a:effectRef idx="0">
-            <a:schemeClr val="accent1"/>
-          </a:effectRef>
-          <a:fontRef idx="minor">
-            <a:schemeClr val="lt1"/>
-          </a:fontRef>
-        </p:style>
-        <p:txBody>
-          <a:bodyPr rtlCol="0" anchor="ctr"/>
-          <a:lstStyle/>
-          <a:p>
-            <a:pPr algn="ctr"/>
-            <a:r>
-              <a:rPr lang="pl-PL" dirty="0"/>
-              <a:t>Repozytoria danych</a:t>
-            </a:r>
-            <a:endParaRPr lang="en-US" dirty="0"/>
-          </a:p>
-        </p:txBody>
-      </p:sp>
-      <p:sp>
-        <p:nvSpPr>
-          <p:cNvPr id="13" name="Rectangle 12">
-            <a:extLst>
-              <a:ext uri="{FF2B5EF4-FFF2-40B4-BE49-F238E27FC236}">
-                <a16:creationId xmlns:a16="http://schemas.microsoft.com/office/drawing/2014/main" id="{96AEF3B1-13EE-4ECA-B801-AD73708AE1CD}"/>
-              </a:ext>
-            </a:extLst>
-          </p:cNvPr>
-          <p:cNvSpPr/>
-          <p:nvPr/>
-        </p:nvSpPr>
-        <p:spPr>
-          <a:xfrm>
-            <a:off x="3225339" y="3812766"/>
-            <a:ext cx="1313411" cy="1197033"/>
-          </a:xfrm>
-          <a:prstGeom prst="rect">
-            <a:avLst/>
-          </a:prstGeom>
-        </p:spPr>
-        <p:style>
-          <a:lnRef idx="2">
-            <a:schemeClr val="accent1">
-              <a:shade val="50000"/>
-            </a:schemeClr>
-          </a:lnRef>
-          <a:fillRef idx="1">
-            <a:schemeClr val="accent1"/>
-          </a:fillRef>
-          <a:effectRef idx="0">
-            <a:schemeClr val="accent1"/>
-          </a:effectRef>
-          <a:fontRef idx="minor">
-            <a:schemeClr val="lt1"/>
-          </a:fontRef>
-        </p:style>
-        <p:txBody>
-          <a:bodyPr rtlCol="0" anchor="ctr"/>
-          <a:lstStyle/>
-          <a:p>
-            <a:pPr algn="ctr"/>
-            <a:r>
-              <a:rPr lang="pl-PL" dirty="0"/>
-              <a:t>Serwisy</a:t>
-            </a:r>
-            <a:endParaRPr lang="en-US" dirty="0"/>
-          </a:p>
-        </p:txBody>
-      </p:sp>
-      <p:sp>
-        <p:nvSpPr>
-          <p:cNvPr id="15" name="Rectangle 14">
-            <a:extLst>
-              <a:ext uri="{FF2B5EF4-FFF2-40B4-BE49-F238E27FC236}">
-                <a16:creationId xmlns:a16="http://schemas.microsoft.com/office/drawing/2014/main" id="{3EFECFA7-7765-40CF-9F58-2F64A79E6DF0}"/>
-              </a:ext>
-            </a:extLst>
-          </p:cNvPr>
-          <p:cNvSpPr/>
-          <p:nvPr/>
-        </p:nvSpPr>
-        <p:spPr>
-          <a:xfrm>
-            <a:off x="6267793" y="3812764"/>
-            <a:ext cx="1313411" cy="1197033"/>
-          </a:xfrm>
-          <a:prstGeom prst="rect">
-            <a:avLst/>
-          </a:prstGeom>
-        </p:spPr>
-        <p:style>
-          <a:lnRef idx="2">
-            <a:schemeClr val="accent1">
-              <a:shade val="50000"/>
-            </a:schemeClr>
-          </a:lnRef>
-          <a:fillRef idx="1">
-            <a:schemeClr val="accent1"/>
-          </a:fillRef>
-          <a:effectRef idx="0">
-            <a:schemeClr val="accent1"/>
-          </a:effectRef>
-          <a:fontRef idx="minor">
-            <a:schemeClr val="lt1"/>
-          </a:fontRef>
-        </p:style>
-        <p:txBody>
-          <a:bodyPr rtlCol="0" anchor="ctr"/>
-          <a:lstStyle/>
-          <a:p>
-            <a:pPr algn="ctr"/>
-            <a:r>
-              <a:rPr lang="pl-PL" dirty="0"/>
-              <a:t>Widoki</a:t>
-            </a:r>
-            <a:endParaRPr lang="en-US" dirty="0"/>
+              <a:rPr lang="pl-PL" sz="2800" dirty="0"/>
+              <a:t>Repozytoria Danych</a:t>
+            </a:r>
+            <a:endParaRPr lang="en-US" sz="2800" dirty="0"/>
           </a:p>
         </p:txBody>
       </p:sp>

</xml_diff>